<commit_message>
feat: add manual-to-PPT skill for converting Excel manuals to PowerPoint
- Implemented core functionality to convert Excel operation manuals into CellGenTech-styled PowerPoint slides.
- Added CLI entry point for the skill with options for interactive mode and configuration.
- Created configuration template and loader for managing output paths and logo settings.
- Developed parser to extract text and images from Excel files.
- Implemented PowerPoint generator to create slides with structured content.
- Added tests for configuration loading, CLI functionality, and legacy compatibility.
- Included requirements for necessary libraries: openpyxl, python-pptx, and Pillow.
</commit_message>
<xml_diff>
--- a/05_mail/相見積操作マニュアル.pptx
+++ b/05_mail/相見積操作マニュアル.pptx
@@ -5,15 +5,15 @@
     <p:sldMasterId id="2147483648" r:id="rId1"/>
   </p:sldMasterIdLst>
   <p:sldIdLst>
-    <p:sldId id="256" r:id="rId2"/>
-    <p:sldId id="257" r:id="rId3"/>
-    <p:sldId id="258" r:id="rId4"/>
-    <p:sldId id="259" r:id="rId5"/>
-    <p:sldId id="260" r:id="rId6"/>
-    <p:sldId id="261" r:id="rId7"/>
-    <p:sldId id="262" r:id="rId8"/>
-    <p:sldId id="263" r:id="rId9"/>
-    <p:sldId id="264" r:id="rId10"/>
+    <p:sldId id="256" r:id="rId7"/>
+    <p:sldId id="257" r:id="rId8"/>
+    <p:sldId id="258" r:id="rId9"/>
+    <p:sldId id="259" r:id="rId10"/>
+    <p:sldId id="260" r:id="rId11"/>
+    <p:sldId id="261" r:id="rId12"/>
+    <p:sldId id="262" r:id="rId13"/>
+    <p:sldId id="263" r:id="rId14"/>
+    <p:sldId id="264" r:id="rId15"/>
   </p:sldIdLst>
   <p:sldSz cx="9144000" cy="6858000" type="screen4x3"/>
   <p:notesSz cx="6858000" cy="9144000"/>
@@ -112,121 +112,7 @@
       </a:defRPr>
     </a:lvl9pPr>
   </p:defaultTextStyle>
-  <p:extLst>
-    <p:ext uri="{EFAFB233-063F-42B5-8137-9DF3F51BA10A}">
-      <p15:sldGuideLst xmlns:p15="http://schemas.microsoft.com/office/powerpoint/2012/main">
-        <p15:guide id="1" orient="horz" pos="2160">
-          <p15:clr>
-            <a:srgbClr val="A4A3A4"/>
-          </p15:clr>
-        </p15:guide>
-        <p15:guide id="2" pos="2880">
-          <p15:clr>
-            <a:srgbClr val="A4A3A4"/>
-          </p15:clr>
-        </p15:guide>
-      </p15:sldGuideLst>
-    </p:ext>
-  </p:extLst>
 </p:presentation>
-</file>
-
-<file path=ppt/revisionInfo.xml><?xml version="1.0" encoding="utf-8"?>
-<p1510:revInfo xmlns:a="http://schemas.openxmlformats.org/drawingml/2006/main" xmlns:r="http://schemas.openxmlformats.org/officeDocument/2006/relationships" xmlns:p1510="http://schemas.microsoft.com/office/powerpoint/2015/10/main">
-  <p1510:revLst>
-    <p1510:client id="{E8C93082-D80C-4778-82FD-6820BDA01B91}" v="26" dt="2026-02-13T01:42:27.038"/>
-  </p1510:revLst>
-</p1510:revInfo>
-</file>
-
-<file path=ppt/changesInfos/changesInfo1.xml><?xml version="1.0" encoding="utf-8"?>
-<pc:chgInfo xmlns:a="http://schemas.openxmlformats.org/drawingml/2006/main" xmlns:r="http://schemas.openxmlformats.org/officeDocument/2006/relationships" xmlns:ac="http://schemas.microsoft.com/office/drawing/2013/main/command" xmlns:pc="http://schemas.microsoft.com/office/powerpoint/2013/main/command">
-  <pc:docChgLst>
-    <pc:chgData name="千賀 聡志" userId="26ee4d46-8985-4ee0-8d74-3ac4b2557c32" providerId="ADAL" clId="{E8C93082-D80C-4778-82FD-6820BDA01B91}"/>
-    <pc:docChg chg="modSld">
-      <pc:chgData name="千賀 聡志" userId="26ee4d46-8985-4ee0-8d74-3ac4b2557c32" providerId="ADAL" clId="{E8C93082-D80C-4778-82FD-6820BDA01B91}" dt="2026-02-13T01:42:39.353" v="93" actId="1076"/>
-      <pc:docMkLst>
-        <pc:docMk/>
-      </pc:docMkLst>
-      <pc:sldChg chg="modSp mod">
-        <pc:chgData name="千賀 聡志" userId="26ee4d46-8985-4ee0-8d74-3ac4b2557c32" providerId="ADAL" clId="{E8C93082-D80C-4778-82FD-6820BDA01B91}" dt="2026-02-13T01:40:25.875" v="0" actId="1036"/>
-        <pc:sldMkLst>
-          <pc:docMk/>
-          <pc:sldMk cId="0" sldId="256"/>
-        </pc:sldMkLst>
-        <pc:spChg chg="mod">
-          <ac:chgData name="千賀 聡志" userId="26ee4d46-8985-4ee0-8d74-3ac4b2557c32" providerId="ADAL" clId="{E8C93082-D80C-4778-82FD-6820BDA01B91}" dt="2026-02-13T01:40:25.875" v="0" actId="1036"/>
-          <ac:spMkLst>
-            <pc:docMk/>
-            <pc:sldMk cId="0" sldId="256"/>
-            <ac:spMk id="4" creationId="{00000000-0000-0000-0000-000000000000}"/>
-          </ac:spMkLst>
-        </pc:spChg>
-      </pc:sldChg>
-      <pc:sldChg chg="addSp modSp mod">
-        <pc:chgData name="千賀 聡志" userId="26ee4d46-8985-4ee0-8d74-3ac4b2557c32" providerId="ADAL" clId="{E8C93082-D80C-4778-82FD-6820BDA01B91}" dt="2026-02-13T01:42:09.474" v="81" actId="1076"/>
-        <pc:sldMkLst>
-          <pc:docMk/>
-          <pc:sldMk cId="0" sldId="258"/>
-        </pc:sldMkLst>
-        <pc:spChg chg="mod">
-          <ac:chgData name="千賀 聡志" userId="26ee4d46-8985-4ee0-8d74-3ac4b2557c32" providerId="ADAL" clId="{E8C93082-D80C-4778-82FD-6820BDA01B91}" dt="2026-02-13T01:42:09.474" v="81" actId="1076"/>
-          <ac:spMkLst>
-            <pc:docMk/>
-            <pc:sldMk cId="0" sldId="258"/>
-            <ac:spMk id="5" creationId="{00000000-0000-0000-0000-000000000000}"/>
-          </ac:spMkLst>
-        </pc:spChg>
-        <pc:picChg chg="add mod">
-          <ac:chgData name="千賀 聡志" userId="26ee4d46-8985-4ee0-8d74-3ac4b2557c32" providerId="ADAL" clId="{E8C93082-D80C-4778-82FD-6820BDA01B91}" dt="2026-02-13T01:40:58.073" v="3" actId="962"/>
-          <ac:picMkLst>
-            <pc:docMk/>
-            <pc:sldMk cId="0" sldId="258"/>
-            <ac:picMk id="8" creationId="{A7A08FBD-C5C4-336A-95D7-A7F69B348572}"/>
-          </ac:picMkLst>
-        </pc:picChg>
-        <pc:picChg chg="add mod">
-          <ac:chgData name="千賀 聡志" userId="26ee4d46-8985-4ee0-8d74-3ac4b2557c32" providerId="ADAL" clId="{E8C93082-D80C-4778-82FD-6820BDA01B91}" dt="2026-02-13T01:41:00.105" v="6" actId="962"/>
-          <ac:picMkLst>
-            <pc:docMk/>
-            <pc:sldMk cId="0" sldId="258"/>
-            <ac:picMk id="10" creationId="{89064670-416B-7EFB-57DF-BDE8CF1BAF74}"/>
-          </ac:picMkLst>
-        </pc:picChg>
-      </pc:sldChg>
-      <pc:sldChg chg="modSp mod">
-        <pc:chgData name="千賀 聡志" userId="26ee4d46-8985-4ee0-8d74-3ac4b2557c32" providerId="ADAL" clId="{E8C93082-D80C-4778-82FD-6820BDA01B91}" dt="2026-02-13T01:42:27.038" v="91"/>
-        <pc:sldMkLst>
-          <pc:docMk/>
-          <pc:sldMk cId="0" sldId="262"/>
-        </pc:sldMkLst>
-        <pc:spChg chg="mod">
-          <ac:chgData name="千賀 聡志" userId="26ee4d46-8985-4ee0-8d74-3ac4b2557c32" providerId="ADAL" clId="{E8C93082-D80C-4778-82FD-6820BDA01B91}" dt="2026-02-13T01:42:27.038" v="91"/>
-          <ac:spMkLst>
-            <pc:docMk/>
-            <pc:sldMk cId="0" sldId="262"/>
-            <ac:spMk id="5" creationId="{00000000-0000-0000-0000-000000000000}"/>
-          </ac:spMkLst>
-        </pc:spChg>
-      </pc:sldChg>
-      <pc:sldChg chg="modSp mod">
-        <pc:chgData name="千賀 聡志" userId="26ee4d46-8985-4ee0-8d74-3ac4b2557c32" providerId="ADAL" clId="{E8C93082-D80C-4778-82FD-6820BDA01B91}" dt="2026-02-13T01:42:39.353" v="93" actId="1076"/>
-        <pc:sldMkLst>
-          <pc:docMk/>
-          <pc:sldMk cId="0" sldId="264"/>
-        </pc:sldMkLst>
-        <pc:spChg chg="mod">
-          <ac:chgData name="千賀 聡志" userId="26ee4d46-8985-4ee0-8d74-3ac4b2557c32" providerId="ADAL" clId="{E8C93082-D80C-4778-82FD-6820BDA01B91}" dt="2026-02-13T01:42:39.353" v="93" actId="1076"/>
-          <ac:spMkLst>
-            <pc:docMk/>
-            <pc:sldMk cId="0" sldId="264"/>
-            <ac:spMk id="5" creationId="{00000000-0000-0000-0000-000000000000}"/>
-          </ac:spMkLst>
-        </pc:spChg>
-      </pc:sldChg>
-    </pc:docChg>
-  </pc:docChgLst>
-</pc:chgInfo>
 </file>
 
 <file path=ppt/slideLayouts/slideLayout1.xml><?xml version="1.0" encoding="utf-8"?>
@@ -267,9 +153,10 @@
           <a:lstStyle/>
           <a:p>
             <a:r>
-              <a:rPr lang="en-US"/>
+              <a:rPr lang="en-US" smtClean="0"/>
               <a:t>Click to edit Master title style</a:t>
             </a:r>
+            <a:endParaRPr lang="en-US"/>
           </a:p>
         </p:txBody>
       </p:sp>
@@ -385,9 +272,10 @@
           </a:lstStyle>
           <a:p>
             <a:r>
-              <a:rPr lang="en-US"/>
+              <a:rPr lang="en-US" smtClean="0"/>
               <a:t>Click to edit Master subtitle style</a:t>
             </a:r>
+            <a:endParaRPr lang="en-US"/>
           </a:p>
         </p:txBody>
       </p:sp>
@@ -408,7 +296,7 @@
           <a:p>
             <a:fld id="{5BCAD085-E8A6-8845-BD4E-CB4CCA059FC4}" type="datetimeFigureOut">
               <a:rPr lang="en-US" smtClean="0"/>
-              <a:t>2/13/2026</a:t>
+              <a:t>1/27/13</a:t>
             </a:fld>
             <a:endParaRPr lang="en-US"/>
           </a:p>
@@ -502,9 +390,10 @@
           <a:lstStyle/>
           <a:p>
             <a:r>
-              <a:rPr lang="en-US"/>
+              <a:rPr lang="en-US" smtClean="0"/>
               <a:t>Click to edit Master title style</a:t>
             </a:r>
+            <a:endParaRPr lang="en-US"/>
           </a:p>
         </p:txBody>
       </p:sp>
@@ -525,37 +414,38 @@
           <a:p>
             <a:pPr lvl="0"/>
             <a:r>
-              <a:rPr lang="en-US"/>
+              <a:rPr lang="en-US" smtClean="0"/>
               <a:t>Click to edit Master text styles</a:t>
             </a:r>
           </a:p>
           <a:p>
             <a:pPr lvl="1"/>
             <a:r>
-              <a:rPr lang="en-US"/>
+              <a:rPr lang="en-US" smtClean="0"/>
               <a:t>Second level</a:t>
             </a:r>
           </a:p>
           <a:p>
             <a:pPr lvl="2"/>
             <a:r>
-              <a:rPr lang="en-US"/>
+              <a:rPr lang="en-US" smtClean="0"/>
               <a:t>Third level</a:t>
             </a:r>
           </a:p>
           <a:p>
             <a:pPr lvl="3"/>
             <a:r>
-              <a:rPr lang="en-US"/>
+              <a:rPr lang="en-US" smtClean="0"/>
               <a:t>Fourth level</a:t>
             </a:r>
           </a:p>
           <a:p>
             <a:pPr lvl="4"/>
             <a:r>
-              <a:rPr lang="en-US"/>
+              <a:rPr lang="en-US" smtClean="0"/>
               <a:t>Fifth level</a:t>
             </a:r>
+            <a:endParaRPr lang="en-US"/>
           </a:p>
         </p:txBody>
       </p:sp>
@@ -576,7 +466,7 @@
           <a:p>
             <a:fld id="{5BCAD085-E8A6-8845-BD4E-CB4CCA059FC4}" type="datetimeFigureOut">
               <a:rPr lang="en-US" smtClean="0"/>
-              <a:t>2/13/2026</a:t>
+              <a:t>1/27/13</a:t>
             </a:fld>
             <a:endParaRPr lang="en-US"/>
           </a:p>
@@ -675,9 +565,10 @@
           <a:lstStyle/>
           <a:p>
             <a:r>
-              <a:rPr lang="en-US"/>
+              <a:rPr lang="en-US" smtClean="0"/>
               <a:t>Click to edit Master title style</a:t>
             </a:r>
+            <a:endParaRPr lang="en-US"/>
           </a:p>
         </p:txBody>
       </p:sp>
@@ -703,37 +594,38 @@
           <a:p>
             <a:pPr lvl="0"/>
             <a:r>
-              <a:rPr lang="en-US"/>
+              <a:rPr lang="en-US" smtClean="0"/>
               <a:t>Click to edit Master text styles</a:t>
             </a:r>
           </a:p>
           <a:p>
             <a:pPr lvl="1"/>
             <a:r>
-              <a:rPr lang="en-US"/>
+              <a:rPr lang="en-US" smtClean="0"/>
               <a:t>Second level</a:t>
             </a:r>
           </a:p>
           <a:p>
             <a:pPr lvl="2"/>
             <a:r>
-              <a:rPr lang="en-US"/>
+              <a:rPr lang="en-US" smtClean="0"/>
               <a:t>Third level</a:t>
             </a:r>
           </a:p>
           <a:p>
             <a:pPr lvl="3"/>
             <a:r>
-              <a:rPr lang="en-US"/>
+              <a:rPr lang="en-US" smtClean="0"/>
               <a:t>Fourth level</a:t>
             </a:r>
           </a:p>
           <a:p>
             <a:pPr lvl="4"/>
             <a:r>
-              <a:rPr lang="en-US"/>
+              <a:rPr lang="en-US" smtClean="0"/>
               <a:t>Fifth level</a:t>
             </a:r>
+            <a:endParaRPr lang="en-US"/>
           </a:p>
         </p:txBody>
       </p:sp>
@@ -754,7 +646,7 @@
           <a:p>
             <a:fld id="{5BCAD085-E8A6-8845-BD4E-CB4CCA059FC4}" type="datetimeFigureOut">
               <a:rPr lang="en-US" smtClean="0"/>
-              <a:t>2/13/2026</a:t>
+              <a:t>1/27/13</a:t>
             </a:fld>
             <a:endParaRPr lang="en-US"/>
           </a:p>
@@ -848,9 +740,10 @@
           <a:lstStyle/>
           <a:p>
             <a:r>
-              <a:rPr lang="en-US"/>
+              <a:rPr lang="en-US" smtClean="0"/>
               <a:t>Click to edit Master title style</a:t>
             </a:r>
+            <a:endParaRPr lang="en-US"/>
           </a:p>
         </p:txBody>
       </p:sp>
@@ -871,37 +764,38 @@
           <a:p>
             <a:pPr lvl="0"/>
             <a:r>
-              <a:rPr lang="en-US"/>
+              <a:rPr lang="en-US" smtClean="0"/>
               <a:t>Click to edit Master text styles</a:t>
             </a:r>
           </a:p>
           <a:p>
             <a:pPr lvl="1"/>
             <a:r>
-              <a:rPr lang="en-US"/>
+              <a:rPr lang="en-US" smtClean="0"/>
               <a:t>Second level</a:t>
             </a:r>
           </a:p>
           <a:p>
             <a:pPr lvl="2"/>
             <a:r>
-              <a:rPr lang="en-US"/>
+              <a:rPr lang="en-US" smtClean="0"/>
               <a:t>Third level</a:t>
             </a:r>
           </a:p>
           <a:p>
             <a:pPr lvl="3"/>
             <a:r>
-              <a:rPr lang="en-US"/>
+              <a:rPr lang="en-US" smtClean="0"/>
               <a:t>Fourth level</a:t>
             </a:r>
           </a:p>
           <a:p>
             <a:pPr lvl="4"/>
             <a:r>
-              <a:rPr lang="en-US"/>
+              <a:rPr lang="en-US" smtClean="0"/>
               <a:t>Fifth level</a:t>
             </a:r>
+            <a:endParaRPr lang="en-US"/>
           </a:p>
         </p:txBody>
       </p:sp>
@@ -922,7 +816,7 @@
           <a:p>
             <a:fld id="{5BCAD085-E8A6-8845-BD4E-CB4CCA059FC4}" type="datetimeFigureOut">
               <a:rPr lang="en-US" smtClean="0"/>
-              <a:t>2/13/2026</a:t>
+              <a:t>1/27/13</a:t>
             </a:fld>
             <a:endParaRPr lang="en-US"/>
           </a:p>
@@ -1025,9 +919,10 @@
           </a:lstStyle>
           <a:p>
             <a:r>
-              <a:rPr lang="en-US"/>
+              <a:rPr lang="en-US" smtClean="0"/>
               <a:t>Click to edit Master title style</a:t>
             </a:r>
+            <a:endParaRPr lang="en-US"/>
           </a:p>
         </p:txBody>
       </p:sp>
@@ -1144,7 +1039,7 @@
           <a:p>
             <a:pPr lvl="0"/>
             <a:r>
-              <a:rPr lang="en-US"/>
+              <a:rPr lang="en-US" smtClean="0"/>
               <a:t>Click to edit Master text styles</a:t>
             </a:r>
           </a:p>
@@ -1167,7 +1062,7 @@
           <a:p>
             <a:fld id="{5BCAD085-E8A6-8845-BD4E-CB4CCA059FC4}" type="datetimeFigureOut">
               <a:rPr lang="en-US" smtClean="0"/>
-              <a:t>2/13/2026</a:t>
+              <a:t>1/27/13</a:t>
             </a:fld>
             <a:endParaRPr lang="en-US"/>
           </a:p>
@@ -1261,9 +1156,10 @@
           <a:lstStyle/>
           <a:p>
             <a:r>
-              <a:rPr lang="en-US"/>
+              <a:rPr lang="en-US" smtClean="0"/>
               <a:t>Click to edit Master title style</a:t>
             </a:r>
+            <a:endParaRPr lang="en-US"/>
           </a:p>
         </p:txBody>
       </p:sp>
@@ -1317,37 +1213,38 @@
           <a:p>
             <a:pPr lvl="0"/>
             <a:r>
-              <a:rPr lang="en-US"/>
+              <a:rPr lang="en-US" smtClean="0"/>
               <a:t>Click to edit Master text styles</a:t>
             </a:r>
           </a:p>
           <a:p>
             <a:pPr lvl="1"/>
             <a:r>
-              <a:rPr lang="en-US"/>
+              <a:rPr lang="en-US" smtClean="0"/>
               <a:t>Second level</a:t>
             </a:r>
           </a:p>
           <a:p>
             <a:pPr lvl="2"/>
             <a:r>
-              <a:rPr lang="en-US"/>
+              <a:rPr lang="en-US" smtClean="0"/>
               <a:t>Third level</a:t>
             </a:r>
           </a:p>
           <a:p>
             <a:pPr lvl="3"/>
             <a:r>
-              <a:rPr lang="en-US"/>
+              <a:rPr lang="en-US" smtClean="0"/>
               <a:t>Fourth level</a:t>
             </a:r>
           </a:p>
           <a:p>
             <a:pPr lvl="4"/>
             <a:r>
-              <a:rPr lang="en-US"/>
+              <a:rPr lang="en-US" smtClean="0"/>
               <a:t>Fifth level</a:t>
             </a:r>
+            <a:endParaRPr lang="en-US"/>
           </a:p>
         </p:txBody>
       </p:sp>
@@ -1401,37 +1298,38 @@
           <a:p>
             <a:pPr lvl="0"/>
             <a:r>
-              <a:rPr lang="en-US"/>
+              <a:rPr lang="en-US" smtClean="0"/>
               <a:t>Click to edit Master text styles</a:t>
             </a:r>
           </a:p>
           <a:p>
             <a:pPr lvl="1"/>
             <a:r>
-              <a:rPr lang="en-US"/>
+              <a:rPr lang="en-US" smtClean="0"/>
               <a:t>Second level</a:t>
             </a:r>
           </a:p>
           <a:p>
             <a:pPr lvl="2"/>
             <a:r>
-              <a:rPr lang="en-US"/>
+              <a:rPr lang="en-US" smtClean="0"/>
               <a:t>Third level</a:t>
             </a:r>
           </a:p>
           <a:p>
             <a:pPr lvl="3"/>
             <a:r>
-              <a:rPr lang="en-US"/>
+              <a:rPr lang="en-US" smtClean="0"/>
               <a:t>Fourth level</a:t>
             </a:r>
           </a:p>
           <a:p>
             <a:pPr lvl="4"/>
             <a:r>
-              <a:rPr lang="en-US"/>
+              <a:rPr lang="en-US" smtClean="0"/>
               <a:t>Fifth level</a:t>
             </a:r>
+            <a:endParaRPr lang="en-US"/>
           </a:p>
         </p:txBody>
       </p:sp>
@@ -1452,7 +1350,7 @@
           <a:p>
             <a:fld id="{5BCAD085-E8A6-8845-BD4E-CB4CCA059FC4}" type="datetimeFigureOut">
               <a:rPr lang="en-US" smtClean="0"/>
-              <a:t>2/13/2026</a:t>
+              <a:t>1/27/13</a:t>
             </a:fld>
             <a:endParaRPr lang="en-US"/>
           </a:p>
@@ -1550,9 +1448,10 @@
           </a:lstStyle>
           <a:p>
             <a:r>
-              <a:rPr lang="en-US"/>
+              <a:rPr lang="en-US" smtClean="0"/>
               <a:t>Click to edit Master title style</a:t>
             </a:r>
+            <a:endParaRPr lang="en-US"/>
           </a:p>
         </p:txBody>
       </p:sp>
@@ -1615,7 +1514,7 @@
           <a:p>
             <a:pPr lvl="0"/>
             <a:r>
-              <a:rPr lang="en-US"/>
+              <a:rPr lang="en-US" smtClean="0"/>
               <a:t>Click to edit Master text styles</a:t>
             </a:r>
           </a:p>
@@ -1671,37 +1570,38 @@
           <a:p>
             <a:pPr lvl="0"/>
             <a:r>
-              <a:rPr lang="en-US"/>
+              <a:rPr lang="en-US" smtClean="0"/>
               <a:t>Click to edit Master text styles</a:t>
             </a:r>
           </a:p>
           <a:p>
             <a:pPr lvl="1"/>
             <a:r>
-              <a:rPr lang="en-US"/>
+              <a:rPr lang="en-US" smtClean="0"/>
               <a:t>Second level</a:t>
             </a:r>
           </a:p>
           <a:p>
             <a:pPr lvl="2"/>
             <a:r>
-              <a:rPr lang="en-US"/>
+              <a:rPr lang="en-US" smtClean="0"/>
               <a:t>Third level</a:t>
             </a:r>
           </a:p>
           <a:p>
             <a:pPr lvl="3"/>
             <a:r>
-              <a:rPr lang="en-US"/>
+              <a:rPr lang="en-US" smtClean="0"/>
               <a:t>Fourth level</a:t>
             </a:r>
           </a:p>
           <a:p>
             <a:pPr lvl="4"/>
             <a:r>
-              <a:rPr lang="en-US"/>
+              <a:rPr lang="en-US" smtClean="0"/>
               <a:t>Fifth level</a:t>
             </a:r>
+            <a:endParaRPr lang="en-US"/>
           </a:p>
         </p:txBody>
       </p:sp>
@@ -1764,7 +1664,7 @@
           <a:p>
             <a:pPr lvl="0"/>
             <a:r>
-              <a:rPr lang="en-US"/>
+              <a:rPr lang="en-US" smtClean="0"/>
               <a:t>Click to edit Master text styles</a:t>
             </a:r>
           </a:p>
@@ -1820,37 +1720,38 @@
           <a:p>
             <a:pPr lvl="0"/>
             <a:r>
-              <a:rPr lang="en-US"/>
+              <a:rPr lang="en-US" smtClean="0"/>
               <a:t>Click to edit Master text styles</a:t>
             </a:r>
           </a:p>
           <a:p>
             <a:pPr lvl="1"/>
             <a:r>
-              <a:rPr lang="en-US"/>
+              <a:rPr lang="en-US" smtClean="0"/>
               <a:t>Second level</a:t>
             </a:r>
           </a:p>
           <a:p>
             <a:pPr lvl="2"/>
             <a:r>
-              <a:rPr lang="en-US"/>
+              <a:rPr lang="en-US" smtClean="0"/>
               <a:t>Third level</a:t>
             </a:r>
           </a:p>
           <a:p>
             <a:pPr lvl="3"/>
             <a:r>
-              <a:rPr lang="en-US"/>
+              <a:rPr lang="en-US" smtClean="0"/>
               <a:t>Fourth level</a:t>
             </a:r>
           </a:p>
           <a:p>
             <a:pPr lvl="4"/>
             <a:r>
-              <a:rPr lang="en-US"/>
+              <a:rPr lang="en-US" smtClean="0"/>
               <a:t>Fifth level</a:t>
             </a:r>
+            <a:endParaRPr lang="en-US"/>
           </a:p>
         </p:txBody>
       </p:sp>
@@ -1871,7 +1772,7 @@
           <a:p>
             <a:fld id="{5BCAD085-E8A6-8845-BD4E-CB4CCA059FC4}" type="datetimeFigureOut">
               <a:rPr lang="en-US" smtClean="0"/>
-              <a:t>2/13/2026</a:t>
+              <a:t>1/27/13</a:t>
             </a:fld>
             <a:endParaRPr lang="en-US"/>
           </a:p>
@@ -1965,9 +1866,10 @@
           <a:lstStyle/>
           <a:p>
             <a:r>
-              <a:rPr lang="en-US"/>
+              <a:rPr lang="en-US" smtClean="0"/>
               <a:t>Click to edit Master title style</a:t>
             </a:r>
+            <a:endParaRPr lang="en-US"/>
           </a:p>
         </p:txBody>
       </p:sp>
@@ -1988,7 +1890,7 @@
           <a:p>
             <a:fld id="{5BCAD085-E8A6-8845-BD4E-CB4CCA059FC4}" type="datetimeFigureOut">
               <a:rPr lang="en-US" smtClean="0"/>
-              <a:t>2/13/2026</a:t>
+              <a:t>1/27/13</a:t>
             </a:fld>
             <a:endParaRPr lang="en-US"/>
           </a:p>
@@ -2083,7 +1985,7 @@
           <a:p>
             <a:fld id="{5BCAD085-E8A6-8845-BD4E-CB4CCA059FC4}" type="datetimeFigureOut">
               <a:rPr lang="en-US" smtClean="0"/>
-              <a:t>2/13/2026</a:t>
+              <a:t>1/27/13</a:t>
             </a:fld>
             <a:endParaRPr lang="en-US"/>
           </a:p>
@@ -2186,9 +2088,10 @@
           </a:lstStyle>
           <a:p>
             <a:r>
-              <a:rPr lang="en-US"/>
+              <a:rPr lang="en-US" smtClean="0"/>
               <a:t>Click to edit Master title style</a:t>
             </a:r>
+            <a:endParaRPr lang="en-US"/>
           </a:p>
         </p:txBody>
       </p:sp>
@@ -2242,37 +2145,38 @@
           <a:p>
             <a:pPr lvl="0"/>
             <a:r>
-              <a:rPr lang="en-US"/>
+              <a:rPr lang="en-US" smtClean="0"/>
               <a:t>Click to edit Master text styles</a:t>
             </a:r>
           </a:p>
           <a:p>
             <a:pPr lvl="1"/>
             <a:r>
-              <a:rPr lang="en-US"/>
+              <a:rPr lang="en-US" smtClean="0"/>
               <a:t>Second level</a:t>
             </a:r>
           </a:p>
           <a:p>
             <a:pPr lvl="2"/>
             <a:r>
-              <a:rPr lang="en-US"/>
+              <a:rPr lang="en-US" smtClean="0"/>
               <a:t>Third level</a:t>
             </a:r>
           </a:p>
           <a:p>
             <a:pPr lvl="3"/>
             <a:r>
-              <a:rPr lang="en-US"/>
+              <a:rPr lang="en-US" smtClean="0"/>
               <a:t>Fourth level</a:t>
             </a:r>
           </a:p>
           <a:p>
             <a:pPr lvl="4"/>
             <a:r>
-              <a:rPr lang="en-US"/>
+              <a:rPr lang="en-US" smtClean="0"/>
               <a:t>Fifth level</a:t>
             </a:r>
+            <a:endParaRPr lang="en-US"/>
           </a:p>
         </p:txBody>
       </p:sp>
@@ -2335,7 +2239,7 @@
           <a:p>
             <a:pPr lvl="0"/>
             <a:r>
-              <a:rPr lang="en-US"/>
+              <a:rPr lang="en-US" smtClean="0"/>
               <a:t>Click to edit Master text styles</a:t>
             </a:r>
           </a:p>
@@ -2358,7 +2262,7 @@
           <a:p>
             <a:fld id="{5BCAD085-E8A6-8845-BD4E-CB4CCA059FC4}" type="datetimeFigureOut">
               <a:rPr lang="en-US" smtClean="0"/>
-              <a:t>2/13/2026</a:t>
+              <a:t>1/27/13</a:t>
             </a:fld>
             <a:endParaRPr lang="en-US"/>
           </a:p>
@@ -2461,9 +2365,10 @@
           </a:lstStyle>
           <a:p>
             <a:r>
-              <a:rPr lang="en-US"/>
+              <a:rPr lang="en-US" smtClean="0"/>
               <a:t>Click to edit Master title style</a:t>
             </a:r>
+            <a:endParaRPr lang="en-US"/>
           </a:p>
         </p:txBody>
       </p:sp>
@@ -2587,7 +2492,7 @@
           <a:p>
             <a:pPr lvl="0"/>
             <a:r>
-              <a:rPr lang="en-US"/>
+              <a:rPr lang="en-US" smtClean="0"/>
               <a:t>Click to edit Master text styles</a:t>
             </a:r>
           </a:p>
@@ -2610,7 +2515,7 @@
           <a:p>
             <a:fld id="{5BCAD085-E8A6-8845-BD4E-CB4CCA059FC4}" type="datetimeFigureOut">
               <a:rPr lang="en-US" smtClean="0"/>
-              <a:t>2/13/2026</a:t>
+              <a:t>1/27/13</a:t>
             </a:fld>
             <a:endParaRPr lang="en-US"/>
           </a:p>
@@ -2719,9 +2624,10 @@
           <a:lstStyle/>
           <a:p>
             <a:r>
-              <a:rPr lang="en-US"/>
+              <a:rPr lang="en-US" smtClean="0"/>
               <a:t>Click to edit Master title style</a:t>
             </a:r>
+            <a:endParaRPr lang="en-US"/>
           </a:p>
         </p:txBody>
       </p:sp>
@@ -2752,37 +2658,38 @@
           <a:p>
             <a:pPr lvl="0"/>
             <a:r>
-              <a:rPr lang="en-US"/>
+              <a:rPr lang="en-US" smtClean="0"/>
               <a:t>Click to edit Master text styles</a:t>
             </a:r>
           </a:p>
           <a:p>
             <a:pPr lvl="1"/>
             <a:r>
-              <a:rPr lang="en-US"/>
+              <a:rPr lang="en-US" smtClean="0"/>
               <a:t>Second level</a:t>
             </a:r>
           </a:p>
           <a:p>
             <a:pPr lvl="2"/>
             <a:r>
-              <a:rPr lang="en-US"/>
+              <a:rPr lang="en-US" smtClean="0"/>
               <a:t>Third level</a:t>
             </a:r>
           </a:p>
           <a:p>
             <a:pPr lvl="3"/>
             <a:r>
-              <a:rPr lang="en-US"/>
+              <a:rPr lang="en-US" smtClean="0"/>
               <a:t>Fourth level</a:t>
             </a:r>
           </a:p>
           <a:p>
             <a:pPr lvl="4"/>
             <a:r>
-              <a:rPr lang="en-US"/>
+              <a:rPr lang="en-US" smtClean="0"/>
               <a:t>Fifth level</a:t>
             </a:r>
+            <a:endParaRPr lang="en-US"/>
           </a:p>
         </p:txBody>
       </p:sp>
@@ -2821,7 +2728,7 @@
           <a:p>
             <a:fld id="{5BCAD085-E8A6-8845-BD4E-CB4CCA059FC4}" type="datetimeFigureOut">
               <a:rPr lang="en-US" smtClean="0"/>
-              <a:t>2/13/2026</a:t>
+              <a:t>1/27/13</a:t>
             </a:fld>
             <a:endParaRPr lang="en-US"/>
           </a:p>
@@ -3180,7 +3087,7 @@
 </file>
 
 <file path=ppt/slides/slide1.xml><?xml version="1.0" encoding="utf-8"?>
-<p:sld xmlns:a="http://schemas.openxmlformats.org/drawingml/2006/main" xmlns:r="http://schemas.openxmlformats.org/officeDocument/2006/relationships" xmlns:p="http://schemas.openxmlformats.org/presentationml/2006/main">
+<p:sld xmlns:a="http://schemas.openxmlformats.org/drawingml/2006/main" xmlns:p="http://schemas.openxmlformats.org/presentationml/2006/main" xmlns:r="http://schemas.openxmlformats.org/officeDocument/2006/relationships">
   <p:cSld>
     <p:spTree>
       <p:nvGrpSpPr>
@@ -3188,14 +3095,7 @@
         <p:cNvGrpSpPr/>
         <p:nvPr/>
       </p:nvGrpSpPr>
-      <p:grpSpPr>
-        <a:xfrm>
-          <a:off x="0" y="0"/>
-          <a:ext cx="0" cy="0"/>
-          <a:chOff x="0" y="0"/>
-          <a:chExt cx="0" cy="0"/>
-        </a:xfrm>
-      </p:grpSpPr>
+      <p:grpSpPr/>
       <p:sp>
         <p:nvSpPr>
           <p:cNvPr id="2" name="Rectangle 1"/>
@@ -3236,7 +3136,6 @@
           <a:lstStyle/>
           <a:p>
             <a:pPr algn="ctr"/>
-            <a:endParaRPr/>
           </a:p>
         </p:txBody>
       </p:sp>
@@ -3267,7 +3166,7 @@
                 <a:solidFill>
                   <a:srgbClr val="FFFFFF"/>
                 </a:solidFill>
-                <a:latin typeface="メイリオ"/>
+                <a:latin typeface="Meiryo"/>
               </a:defRPr>
             </a:pPr>
             <a:r>
@@ -3284,7 +3183,7 @@
         </p:nvSpPr>
         <p:spPr>
           <a:xfrm>
-            <a:off x="457200" y="2752436"/>
+            <a:off x="457200" y="2743200"/>
             <a:ext cx="8229600" cy="731520"/>
           </a:xfrm>
           <a:prstGeom prst="rect">
@@ -3303,7 +3202,7 @@
                 <a:solidFill>
                   <a:srgbClr val="003366"/>
                 </a:solidFill>
-                <a:latin typeface="メイリオ"/>
+                <a:latin typeface="Meiryo"/>
               </a:defRPr>
             </a:pPr>
             <a:r>
@@ -3352,7 +3251,6 @@
           <a:lstStyle/>
           <a:p>
             <a:pPr algn="ctr"/>
-            <a:endParaRPr/>
           </a:p>
         </p:txBody>
       </p:sp>
@@ -3389,7 +3287,7 @@
 </file>
 
 <file path=ppt/slides/slide2.xml><?xml version="1.0" encoding="utf-8"?>
-<p:sld xmlns:a="http://schemas.openxmlformats.org/drawingml/2006/main" xmlns:r="http://schemas.openxmlformats.org/officeDocument/2006/relationships" xmlns:p="http://schemas.openxmlformats.org/presentationml/2006/main">
+<p:sld xmlns:a="http://schemas.openxmlformats.org/drawingml/2006/main" xmlns:p="http://schemas.openxmlformats.org/presentationml/2006/main" xmlns:r="http://schemas.openxmlformats.org/officeDocument/2006/relationships">
   <p:cSld>
     <p:spTree>
       <p:nvGrpSpPr>
@@ -3397,14 +3295,7 @@
         <p:cNvGrpSpPr/>
         <p:nvPr/>
       </p:nvGrpSpPr>
-      <p:grpSpPr>
-        <a:xfrm>
-          <a:off x="0" y="0"/>
-          <a:ext cx="0" cy="0"/>
-          <a:chOff x="0" y="0"/>
-          <a:chExt cx="0" cy="0"/>
-        </a:xfrm>
-      </p:grpSpPr>
+      <p:grpSpPr/>
       <p:sp>
         <p:nvSpPr>
           <p:cNvPr id="2" name="Rectangle 1"/>
@@ -3445,7 +3336,6 @@
           <a:lstStyle/>
           <a:p>
             <a:pPr algn="ctr"/>
-            <a:endParaRPr/>
           </a:p>
         </p:txBody>
       </p:sp>
@@ -3476,7 +3366,7 @@
                 <a:solidFill>
                   <a:srgbClr val="FFFFFF"/>
                 </a:solidFill>
-                <a:latin typeface="メイリオ"/>
+                <a:latin typeface="Meiryo"/>
               </a:defRPr>
             </a:pPr>
             <a:r>
@@ -3527,7 +3417,6 @@
           <a:lstStyle/>
           <a:p>
             <a:pPr algn="ctr"/>
-            <a:endParaRPr/>
           </a:p>
         </p:txBody>
       </p:sp>
@@ -3558,7 +3447,7 @@
                 <a:solidFill>
                   <a:srgbClr val="003366"/>
                 </a:solidFill>
-                <a:latin typeface="メイリオ"/>
+                <a:latin typeface="Meiryo"/>
               </a:defRPr>
             </a:pPr>
             <a:r>
@@ -3624,7 +3513,7 @@
 </file>
 
 <file path=ppt/slides/slide3.xml><?xml version="1.0" encoding="utf-8"?>
-<p:sld xmlns:a="http://schemas.openxmlformats.org/drawingml/2006/main" xmlns:r="http://schemas.openxmlformats.org/officeDocument/2006/relationships" xmlns:p="http://schemas.openxmlformats.org/presentationml/2006/main">
+<p:sld xmlns:a="http://schemas.openxmlformats.org/drawingml/2006/main" xmlns:p="http://schemas.openxmlformats.org/presentationml/2006/main" xmlns:r="http://schemas.openxmlformats.org/officeDocument/2006/relationships">
   <p:cSld>
     <p:spTree>
       <p:nvGrpSpPr>
@@ -3632,14 +3521,7 @@
         <p:cNvGrpSpPr/>
         <p:nvPr/>
       </p:nvGrpSpPr>
-      <p:grpSpPr>
-        <a:xfrm>
-          <a:off x="0" y="0"/>
-          <a:ext cx="0" cy="0"/>
-          <a:chOff x="0" y="0"/>
-          <a:chExt cx="0" cy="0"/>
-        </a:xfrm>
-      </p:grpSpPr>
+      <p:grpSpPr/>
       <p:sp>
         <p:nvSpPr>
           <p:cNvPr id="2" name="Rectangle 1"/>
@@ -3680,7 +3562,6 @@
           <a:lstStyle/>
           <a:p>
             <a:pPr algn="ctr"/>
-            <a:endParaRPr/>
           </a:p>
         </p:txBody>
       </p:sp>
@@ -3711,7 +3592,7 @@
                 <a:solidFill>
                   <a:srgbClr val="FFFFFF"/>
                 </a:solidFill>
-                <a:latin typeface="メイリオ"/>
+                <a:latin typeface="Meiryo"/>
               </a:defRPr>
             </a:pPr>
             <a:r>
@@ -3762,7 +3643,6 @@
           <a:lstStyle/>
           <a:p>
             <a:pPr algn="ctr"/>
-            <a:endParaRPr/>
           </a:p>
         </p:txBody>
       </p:sp>
@@ -3774,8 +3654,8 @@
         </p:nvSpPr>
         <p:spPr>
           <a:xfrm>
-            <a:off x="548640" y="697120"/>
-            <a:ext cx="8046720" cy="707886"/>
+            <a:off x="548640" y="777240"/>
+            <a:ext cx="8046720" cy="457200"/>
           </a:xfrm>
           <a:prstGeom prst="rect">
             <a:avLst/>
@@ -3793,67 +3673,12 @@
                 <a:solidFill>
                   <a:srgbClr val="003366"/>
                 </a:solidFill>
-                <a:latin typeface="メイリオ"/>
+                <a:latin typeface="Meiryo"/>
               </a:defRPr>
             </a:pPr>
             <a:r>
-              <a:rPr dirty="0" err="1"/>
-              <a:t>タブの</a:t>
-            </a:r>
-            <a:r>
-              <a:rPr lang="ja-JP" altLang="en-US" dirty="0"/>
-              <a:t>「</a:t>
-            </a:r>
-            <a:r>
-              <a:rPr dirty="0" err="1"/>
-              <a:t>差し込み文書</a:t>
-            </a:r>
-            <a:r>
-              <a:rPr lang="ja-JP" altLang="en-US" dirty="0"/>
-              <a:t>」</a:t>
-            </a:r>
-            <a:r>
-              <a:rPr dirty="0"/>
-              <a:t>の</a:t>
-            </a:r>
-            <a:r>
-              <a:rPr lang="ja-JP" altLang="en-US" dirty="0"/>
-              <a:t>「</a:t>
-            </a:r>
-            <a:r>
-              <a:rPr dirty="0" err="1"/>
-              <a:t>宛先の選択</a:t>
-            </a:r>
-            <a:r>
-              <a:rPr lang="ja-JP" altLang="en-US" dirty="0"/>
-              <a:t>」「</a:t>
-            </a:r>
-            <a:r>
-              <a:rPr lang="ja-JP" altLang="en-US" dirty="0">
-                <a:latin typeface="メイリオ" panose="020B0604030504040204" pitchFamily="50" charset="-128"/>
-                <a:ea typeface="メイリオ" panose="020B0604030504040204" pitchFamily="50" charset="-128"/>
-              </a:rPr>
-              <a:t>既存のリストを使用」</a:t>
-            </a:r>
-            <a:endParaRPr lang="en-US" altLang="ja-JP" dirty="0">
-              <a:latin typeface="メイリオ" panose="020B0604030504040204" pitchFamily="50" charset="-128"/>
-              <a:ea typeface="メイリオ" panose="020B0604030504040204" pitchFamily="50" charset="-128"/>
-            </a:endParaRPr>
-          </a:p>
-          <a:p>
-            <a:pPr algn="l">
-              <a:defRPr sz="2000">
-                <a:solidFill>
-                  <a:srgbClr val="003366"/>
-                </a:solidFill>
-                <a:latin typeface="メイリオ"/>
-              </a:defRPr>
-            </a:pPr>
-            <a:r>
-              <a:rPr dirty="0" err="1"/>
-              <a:t>をクリック</a:t>
-            </a:r>
-            <a:endParaRPr dirty="0"/>
+              <a:t>タブの差し込み文書の宛先の選択をクリック</a:t>
+            </a:r>
           </a:p>
         </p:txBody>
       </p:sp>
@@ -3881,66 +3706,6 @@
           </a:prstGeom>
         </p:spPr>
       </p:pic>
-      <p:pic>
-        <p:nvPicPr>
-          <p:cNvPr id="8" name="図 7" descr="グラフィカル ユーザー インターフェイス, アプリケーション&#10;&#10;自動的に生成された説明">
-            <a:extLst>
-              <a:ext uri="{FF2B5EF4-FFF2-40B4-BE49-F238E27FC236}">
-                <a16:creationId xmlns:a16="http://schemas.microsoft.com/office/drawing/2014/main" id="{A7A08FBD-C5C4-336A-95D7-A7F69B348572}"/>
-              </a:ext>
-            </a:extLst>
-          </p:cNvPr>
-          <p:cNvPicPr>
-            <a:picLocks noChangeAspect="1"/>
-          </p:cNvPicPr>
-          <p:nvPr/>
-        </p:nvPicPr>
-        <p:blipFill>
-          <a:blip r:embed="rId3"/>
-          <a:stretch>
-            <a:fillRect/>
-          </a:stretch>
-        </p:blipFill>
-        <p:spPr>
-          <a:xfrm>
-            <a:off x="0" y="2113210"/>
-            <a:ext cx="9144000" cy="2631580"/>
-          </a:xfrm>
-          <a:prstGeom prst="rect">
-            <a:avLst/>
-          </a:prstGeom>
-        </p:spPr>
-      </p:pic>
-      <p:pic>
-        <p:nvPicPr>
-          <p:cNvPr id="10" name="図 9" descr="グラフィカル ユーザー インターフェイス, アプリケーション&#10;&#10;自動的に生成された説明">
-            <a:extLst>
-              <a:ext uri="{FF2B5EF4-FFF2-40B4-BE49-F238E27FC236}">
-                <a16:creationId xmlns:a16="http://schemas.microsoft.com/office/drawing/2014/main" id="{89064670-416B-7EFB-57DF-BDE8CF1BAF74}"/>
-              </a:ext>
-            </a:extLst>
-          </p:cNvPr>
-          <p:cNvPicPr>
-            <a:picLocks noChangeAspect="1"/>
-          </p:cNvPicPr>
-          <p:nvPr/>
-        </p:nvPicPr>
-        <p:blipFill>
-          <a:blip r:embed="rId3"/>
-          <a:stretch>
-            <a:fillRect/>
-          </a:stretch>
-        </p:blipFill>
-        <p:spPr>
-          <a:xfrm>
-            <a:off x="0" y="2113210"/>
-            <a:ext cx="9144000" cy="2631580"/>
-          </a:xfrm>
-          <a:prstGeom prst="rect">
-            <a:avLst/>
-          </a:prstGeom>
-        </p:spPr>
-      </p:pic>
     </p:spTree>
   </p:cSld>
   <p:clrMapOvr>
@@ -3950,7 +3715,7 @@
 </file>
 
 <file path=ppt/slides/slide4.xml><?xml version="1.0" encoding="utf-8"?>
-<p:sld xmlns:a="http://schemas.openxmlformats.org/drawingml/2006/main" xmlns:r="http://schemas.openxmlformats.org/officeDocument/2006/relationships" xmlns:p="http://schemas.openxmlformats.org/presentationml/2006/main">
+<p:sld xmlns:a="http://schemas.openxmlformats.org/drawingml/2006/main" xmlns:p="http://schemas.openxmlformats.org/presentationml/2006/main" xmlns:r="http://schemas.openxmlformats.org/officeDocument/2006/relationships">
   <p:cSld>
     <p:spTree>
       <p:nvGrpSpPr>
@@ -3958,14 +3723,7 @@
         <p:cNvGrpSpPr/>
         <p:nvPr/>
       </p:nvGrpSpPr>
-      <p:grpSpPr>
-        <a:xfrm>
-          <a:off x="0" y="0"/>
-          <a:ext cx="0" cy="0"/>
-          <a:chOff x="0" y="0"/>
-          <a:chExt cx="0" cy="0"/>
-        </a:xfrm>
-      </p:grpSpPr>
+      <p:grpSpPr/>
       <p:sp>
         <p:nvSpPr>
           <p:cNvPr id="2" name="Rectangle 1"/>
@@ -4006,7 +3764,6 @@
           <a:lstStyle/>
           <a:p>
             <a:pPr algn="ctr"/>
-            <a:endParaRPr/>
           </a:p>
         </p:txBody>
       </p:sp>
@@ -4037,7 +3794,7 @@
                 <a:solidFill>
                   <a:srgbClr val="FFFFFF"/>
                 </a:solidFill>
-                <a:latin typeface="メイリオ"/>
+                <a:latin typeface="Meiryo"/>
               </a:defRPr>
             </a:pPr>
             <a:r>
@@ -4088,7 +3845,6 @@
           <a:lstStyle/>
           <a:p>
             <a:pPr algn="ctr"/>
-            <a:endParaRPr/>
           </a:p>
         </p:txBody>
       </p:sp>
@@ -4119,7 +3875,7 @@
                 <a:solidFill>
                   <a:srgbClr val="003366"/>
                 </a:solidFill>
-                <a:latin typeface="メイリオ"/>
+                <a:latin typeface="Meiryo"/>
               </a:defRPr>
             </a:pPr>
             <a:r>
@@ -4185,7 +3941,7 @@
 </file>
 
 <file path=ppt/slides/slide5.xml><?xml version="1.0" encoding="utf-8"?>
-<p:sld xmlns:a="http://schemas.openxmlformats.org/drawingml/2006/main" xmlns:r="http://schemas.openxmlformats.org/officeDocument/2006/relationships" xmlns:p="http://schemas.openxmlformats.org/presentationml/2006/main">
+<p:sld xmlns:a="http://schemas.openxmlformats.org/drawingml/2006/main" xmlns:p="http://schemas.openxmlformats.org/presentationml/2006/main" xmlns:r="http://schemas.openxmlformats.org/officeDocument/2006/relationships">
   <p:cSld>
     <p:spTree>
       <p:nvGrpSpPr>
@@ -4193,14 +3949,7 @@
         <p:cNvGrpSpPr/>
         <p:nvPr/>
       </p:nvGrpSpPr>
-      <p:grpSpPr>
-        <a:xfrm>
-          <a:off x="0" y="0"/>
-          <a:ext cx="0" cy="0"/>
-          <a:chOff x="0" y="0"/>
-          <a:chExt cx="0" cy="0"/>
-        </a:xfrm>
-      </p:grpSpPr>
+      <p:grpSpPr/>
       <p:sp>
         <p:nvSpPr>
           <p:cNvPr id="2" name="Rectangle 1"/>
@@ -4241,7 +3990,6 @@
           <a:lstStyle/>
           <a:p>
             <a:pPr algn="ctr"/>
-            <a:endParaRPr/>
           </a:p>
         </p:txBody>
       </p:sp>
@@ -4272,7 +4020,7 @@
                 <a:solidFill>
                   <a:srgbClr val="FFFFFF"/>
                 </a:solidFill>
-                <a:latin typeface="メイリオ"/>
+                <a:latin typeface="Meiryo"/>
               </a:defRPr>
             </a:pPr>
             <a:r>
@@ -4323,7 +4071,6 @@
           <a:lstStyle/>
           <a:p>
             <a:pPr algn="ctr"/>
-            <a:endParaRPr/>
           </a:p>
         </p:txBody>
       </p:sp>
@@ -4354,7 +4101,7 @@
                 <a:solidFill>
                   <a:srgbClr val="003366"/>
                 </a:solidFill>
-                <a:latin typeface="メイリオ"/>
+                <a:latin typeface="Meiryo"/>
               </a:defRPr>
             </a:pPr>
             <a:r>
@@ -4420,7 +4167,7 @@
 </file>
 
 <file path=ppt/slides/slide6.xml><?xml version="1.0" encoding="utf-8"?>
-<p:sld xmlns:a="http://schemas.openxmlformats.org/drawingml/2006/main" xmlns:r="http://schemas.openxmlformats.org/officeDocument/2006/relationships" xmlns:p="http://schemas.openxmlformats.org/presentationml/2006/main">
+<p:sld xmlns:a="http://schemas.openxmlformats.org/drawingml/2006/main" xmlns:p="http://schemas.openxmlformats.org/presentationml/2006/main" xmlns:r="http://schemas.openxmlformats.org/officeDocument/2006/relationships">
   <p:cSld>
     <p:spTree>
       <p:nvGrpSpPr>
@@ -4428,14 +4175,7 @@
         <p:cNvGrpSpPr/>
         <p:nvPr/>
       </p:nvGrpSpPr>
-      <p:grpSpPr>
-        <a:xfrm>
-          <a:off x="0" y="0"/>
-          <a:ext cx="0" cy="0"/>
-          <a:chOff x="0" y="0"/>
-          <a:chExt cx="0" cy="0"/>
-        </a:xfrm>
-      </p:grpSpPr>
+      <p:grpSpPr/>
       <p:sp>
         <p:nvSpPr>
           <p:cNvPr id="2" name="Rectangle 1"/>
@@ -4476,7 +4216,6 @@
           <a:lstStyle/>
           <a:p>
             <a:pPr algn="ctr"/>
-            <a:endParaRPr/>
           </a:p>
         </p:txBody>
       </p:sp>
@@ -4507,7 +4246,7 @@
                 <a:solidFill>
                   <a:srgbClr val="FFFFFF"/>
                 </a:solidFill>
-                <a:latin typeface="メイリオ"/>
+                <a:latin typeface="Meiryo"/>
               </a:defRPr>
             </a:pPr>
             <a:r>
@@ -4558,7 +4297,6 @@
           <a:lstStyle/>
           <a:p>
             <a:pPr algn="ctr"/>
-            <a:endParaRPr/>
           </a:p>
         </p:txBody>
       </p:sp>
@@ -4589,7 +4327,7 @@
                 <a:solidFill>
                   <a:srgbClr val="003366"/>
                 </a:solidFill>
-                <a:latin typeface="メイリオ"/>
+                <a:latin typeface="Meiryo"/>
               </a:defRPr>
             </a:pPr>
             <a:r>
@@ -4655,7 +4393,7 @@
 </file>
 
 <file path=ppt/slides/slide7.xml><?xml version="1.0" encoding="utf-8"?>
-<p:sld xmlns:a="http://schemas.openxmlformats.org/drawingml/2006/main" xmlns:r="http://schemas.openxmlformats.org/officeDocument/2006/relationships" xmlns:p="http://schemas.openxmlformats.org/presentationml/2006/main">
+<p:sld xmlns:a="http://schemas.openxmlformats.org/drawingml/2006/main" xmlns:p="http://schemas.openxmlformats.org/presentationml/2006/main" xmlns:r="http://schemas.openxmlformats.org/officeDocument/2006/relationships">
   <p:cSld>
     <p:spTree>
       <p:nvGrpSpPr>
@@ -4663,14 +4401,7 @@
         <p:cNvGrpSpPr/>
         <p:nvPr/>
       </p:nvGrpSpPr>
-      <p:grpSpPr>
-        <a:xfrm>
-          <a:off x="0" y="0"/>
-          <a:ext cx="0" cy="0"/>
-          <a:chOff x="0" y="0"/>
-          <a:chExt cx="0" cy="0"/>
-        </a:xfrm>
-      </p:grpSpPr>
+      <p:grpSpPr/>
       <p:sp>
         <p:nvSpPr>
           <p:cNvPr id="2" name="Rectangle 1"/>
@@ -4711,7 +4442,6 @@
           <a:lstStyle/>
           <a:p>
             <a:pPr algn="ctr"/>
-            <a:endParaRPr/>
           </a:p>
         </p:txBody>
       </p:sp>
@@ -4742,7 +4472,7 @@
                 <a:solidFill>
                   <a:srgbClr val="FFFFFF"/>
                 </a:solidFill>
-                <a:latin typeface="メイリオ"/>
+                <a:latin typeface="Meiryo"/>
               </a:defRPr>
             </a:pPr>
             <a:r>
@@ -4793,7 +4523,6 @@
           <a:lstStyle/>
           <a:p>
             <a:pPr algn="ctr"/>
-            <a:endParaRPr/>
           </a:p>
         </p:txBody>
       </p:sp>
@@ -4806,7 +4535,7 @@
         <p:spPr>
           <a:xfrm>
             <a:off x="548640" y="777240"/>
-            <a:ext cx="8046720" cy="400110"/>
+            <a:ext cx="8046720" cy="457200"/>
           </a:xfrm>
           <a:prstGeom prst="rect">
             <a:avLst/>
@@ -4824,24 +4553,11 @@
                 <a:solidFill>
                   <a:srgbClr val="003366"/>
                 </a:solidFill>
-                <a:latin typeface="メイリオ"/>
+                <a:latin typeface="Meiryo"/>
               </a:defRPr>
             </a:pPr>
             <a:r>
-              <a:rPr dirty="0" err="1"/>
-              <a:t>見積依頼メールの内容は</a:t>
-            </a:r>
-            <a:r>
-              <a:rPr lang="en-US" altLang="ja-JP" dirty="0" err="1"/>
-              <a:t>Word</a:t>
-            </a:r>
-            <a:r>
-              <a:rPr dirty="0" err="1"/>
-              <a:t>の本文で作成します</a:t>
-            </a:r>
-            <a:r>
-              <a:rPr dirty="0"/>
-              <a:t>。</a:t>
+              <a:t>見積依頼メールの内容は以下の本文で作成します。</a:t>
             </a:r>
           </a:p>
         </p:txBody>
@@ -4903,7 +4619,7 @@
 </file>
 
 <file path=ppt/slides/slide8.xml><?xml version="1.0" encoding="utf-8"?>
-<p:sld xmlns:a="http://schemas.openxmlformats.org/drawingml/2006/main" xmlns:r="http://schemas.openxmlformats.org/officeDocument/2006/relationships" xmlns:p="http://schemas.openxmlformats.org/presentationml/2006/main">
+<p:sld xmlns:a="http://schemas.openxmlformats.org/drawingml/2006/main" xmlns:p="http://schemas.openxmlformats.org/presentationml/2006/main" xmlns:r="http://schemas.openxmlformats.org/officeDocument/2006/relationships">
   <p:cSld>
     <p:spTree>
       <p:nvGrpSpPr>
@@ -4911,14 +4627,7 @@
         <p:cNvGrpSpPr/>
         <p:nvPr/>
       </p:nvGrpSpPr>
-      <p:grpSpPr>
-        <a:xfrm>
-          <a:off x="0" y="0"/>
-          <a:ext cx="0" cy="0"/>
-          <a:chOff x="0" y="0"/>
-          <a:chExt cx="0" cy="0"/>
-        </a:xfrm>
-      </p:grpSpPr>
+      <p:grpSpPr/>
       <p:sp>
         <p:nvSpPr>
           <p:cNvPr id="2" name="Rectangle 1"/>
@@ -4959,7 +4668,6 @@
           <a:lstStyle/>
           <a:p>
             <a:pPr algn="ctr"/>
-            <a:endParaRPr/>
           </a:p>
         </p:txBody>
       </p:sp>
@@ -4990,7 +4698,7 @@
                 <a:solidFill>
                   <a:srgbClr val="FFFFFF"/>
                 </a:solidFill>
-                <a:latin typeface="メイリオ"/>
+                <a:latin typeface="Meiryo"/>
               </a:defRPr>
             </a:pPr>
             <a:r>
@@ -5041,7 +4749,6 @@
           <a:lstStyle/>
           <a:p>
             <a:pPr algn="ctr"/>
-            <a:endParaRPr/>
           </a:p>
         </p:txBody>
       </p:sp>
@@ -5072,7 +4779,7 @@
                 <a:solidFill>
                   <a:srgbClr val="003366"/>
                 </a:solidFill>
-                <a:latin typeface="メイリオ"/>
+                <a:latin typeface="Meiryo"/>
               </a:defRPr>
             </a:pPr>
             <a:r>
@@ -5138,7 +4845,7 @@
 </file>
 
 <file path=ppt/slides/slide9.xml><?xml version="1.0" encoding="utf-8"?>
-<p:sld xmlns:a="http://schemas.openxmlformats.org/drawingml/2006/main" xmlns:r="http://schemas.openxmlformats.org/officeDocument/2006/relationships" xmlns:p="http://schemas.openxmlformats.org/presentationml/2006/main">
+<p:sld xmlns:a="http://schemas.openxmlformats.org/drawingml/2006/main" xmlns:p="http://schemas.openxmlformats.org/presentationml/2006/main" xmlns:r="http://schemas.openxmlformats.org/officeDocument/2006/relationships">
   <p:cSld>
     <p:spTree>
       <p:nvGrpSpPr>
@@ -5146,14 +4853,7 @@
         <p:cNvGrpSpPr/>
         <p:nvPr/>
       </p:nvGrpSpPr>
-      <p:grpSpPr>
-        <a:xfrm>
-          <a:off x="0" y="0"/>
-          <a:ext cx="0" cy="0"/>
-          <a:chOff x="0" y="0"/>
-          <a:chExt cx="0" cy="0"/>
-        </a:xfrm>
-      </p:grpSpPr>
+      <p:grpSpPr/>
       <p:sp>
         <p:nvSpPr>
           <p:cNvPr id="2" name="Rectangle 1"/>
@@ -5194,7 +4894,6 @@
           <a:lstStyle/>
           <a:p>
             <a:pPr algn="ctr"/>
-            <a:endParaRPr/>
           </a:p>
         </p:txBody>
       </p:sp>
@@ -5225,7 +4924,7 @@
                 <a:solidFill>
                   <a:srgbClr val="FFFFFF"/>
                 </a:solidFill>
-                <a:latin typeface="メイリオ"/>
+                <a:latin typeface="Meiryo"/>
               </a:defRPr>
             </a:pPr>
             <a:r>
@@ -5276,7 +4975,6 @@
           <a:lstStyle/>
           <a:p>
             <a:pPr algn="ctr"/>
-            <a:endParaRPr/>
           </a:p>
         </p:txBody>
       </p:sp>
@@ -5288,8 +4986,8 @@
         </p:nvSpPr>
         <p:spPr>
           <a:xfrm>
-            <a:off x="548640" y="731520"/>
-            <a:ext cx="8046720" cy="707886"/>
+            <a:off x="548640" y="777240"/>
+            <a:ext cx="8046720" cy="457200"/>
           </a:xfrm>
           <a:prstGeom prst="rect">
             <a:avLst/>
@@ -5307,29 +5005,12 @@
                 <a:solidFill>
                   <a:srgbClr val="003366"/>
                 </a:solidFill>
-                <a:latin typeface="メイリオ"/>
+                <a:latin typeface="Meiryo"/>
               </a:defRPr>
             </a:pPr>
             <a:r>
-              <a:rPr dirty="0" err="1"/>
-              <a:t>OKを押すと件名欄に入力した内容のタイトルで</a:t>
-            </a:r>
-            <a:endParaRPr lang="en-US" dirty="0"/>
-          </a:p>
-          <a:p>
-            <a:pPr algn="l">
-              <a:defRPr sz="2000">
-                <a:solidFill>
-                  <a:srgbClr val="003366"/>
-                </a:solidFill>
-                <a:latin typeface="メイリオ"/>
-              </a:defRPr>
-            </a:pPr>
-            <a:r>
-              <a:rPr dirty="0" err="1"/>
-              <a:t>各社へメールが行きます</a:t>
-            </a:r>
-            <a:endParaRPr dirty="0"/>
+              <a:t>OKを押すと件名欄に入力した内容のタイトルで各社へメールが行きます</a:t>
+            </a:r>
           </a:p>
         </p:txBody>
       </p:sp>

</xml_diff>